<commit_message>
updated background slide and added non-functional requirements
</commit_message>
<xml_diff>
--- a/Project 1/CS554_EuroTeam_Proposal.pptx
+++ b/Project 1/CS554_EuroTeam_Proposal.pptx
@@ -1,14 +1,14 @@
 
 <file path=ppt/presentation.xml><?xml version="1.0" encoding="utf-8"?>
-<p:presentation xmlns:a="http://schemas.openxmlformats.org/drawingml/2006/main" xmlns:r="http://schemas.openxmlformats.org/officeDocument/2006/relationships" xmlns:p="http://schemas.openxmlformats.org/presentationml/2006/main" saveSubsetFonts="1">
+<p:presentation xmlns:a="http://schemas.openxmlformats.org/drawingml/2006/main" xmlns:r="http://schemas.openxmlformats.org/officeDocument/2006/relationships" xmlns:mc="http://schemas.openxmlformats.org/markup-compatibility/2006" xmlns:mv="urn:schemas-microsoft-com:mac:vml" xmlns:p="http://schemas.openxmlformats.org/presentationml/2006/main" mc:Ignorable="mv" mc:PreserveAttributes="mv:*" saveSubsetFonts="1">
   <p:sldMasterIdLst>
     <p:sldMasterId id="2147483660" r:id="rId1"/>
   </p:sldMasterIdLst>
   <p:notesMasterIdLst>
-    <p:notesMasterId r:id="rId9"/>
+    <p:notesMasterId r:id="rId11"/>
   </p:notesMasterIdLst>
   <p:handoutMasterIdLst>
-    <p:handoutMasterId r:id="rId10"/>
+    <p:handoutMasterId r:id="rId12"/>
   </p:handoutMasterIdLst>
   <p:sldIdLst>
     <p:sldId id="256" r:id="rId2"/>
@@ -17,7 +17,9 @@
     <p:sldId id="290" r:id="rId5"/>
     <p:sldId id="287" r:id="rId6"/>
     <p:sldId id="289" r:id="rId7"/>
-    <p:sldId id="286" r:id="rId8"/>
+    <p:sldId id="291" r:id="rId8"/>
+    <p:sldId id="292" r:id="rId9"/>
+    <p:sldId id="286" r:id="rId10"/>
   </p:sldIdLst>
   <p:sldSz cx="9144000" cy="6858000" type="screen4x3"/>
   <p:notesSz cx="6858000" cy="9144000"/>
@@ -150,7 +152,7 @@
 </file>
 
 <file path=ppt/handoutMasters/handoutMaster1.xml><?xml version="1.0" encoding="utf-8"?>
-<p:handoutMaster xmlns:a="http://schemas.openxmlformats.org/drawingml/2006/main" xmlns:r="http://schemas.openxmlformats.org/officeDocument/2006/relationships" xmlns:p="http://schemas.openxmlformats.org/presentationml/2006/main">
+<p:handoutMaster xmlns:a="http://schemas.openxmlformats.org/drawingml/2006/main" xmlns:r="http://schemas.openxmlformats.org/officeDocument/2006/relationships" xmlns:mc="http://schemas.openxmlformats.org/markup-compatibility/2006" xmlns:mv="urn:schemas-microsoft-com:mac:vml" xmlns:p="http://schemas.openxmlformats.org/presentationml/2006/main" mc:Ignorable="mv" mc:PreserveAttributes="mv:*">
   <p:cSld>
     <p:bg>
       <p:bgRef idx="1001">
@@ -253,7 +255,7 @@
               <a:pPr>
                 <a:defRPr/>
               </a:pPr>
-              <a:t>24/09/2009</a:t>
+              <a:t>9/24/09</a:t>
             </a:fld>
             <a:endParaRPr lang="fr-FR" altLang="ko-KR"/>
           </a:p>
@@ -341,7 +343,7 @@
               <a:pPr>
                 <a:defRPr/>
               </a:pPr>
-              <a:t>‹N°›</a:t>
+              <a:t>‹#›</a:t>
             </a:fld>
             <a:endParaRPr lang="fr-FR" altLang="ko-KR"/>
           </a:p>
@@ -354,7 +356,7 @@
 </file>
 
 <file path=ppt/notesMasters/notesMaster1.xml><?xml version="1.0" encoding="utf-8"?>
-<p:notesMaster xmlns:a="http://schemas.openxmlformats.org/drawingml/2006/main" xmlns:r="http://schemas.openxmlformats.org/officeDocument/2006/relationships" xmlns:p="http://schemas.openxmlformats.org/presentationml/2006/main">
+<p:notesMaster xmlns:a="http://schemas.openxmlformats.org/drawingml/2006/main" xmlns:r="http://schemas.openxmlformats.org/officeDocument/2006/relationships" xmlns:mc="http://schemas.openxmlformats.org/markup-compatibility/2006" xmlns:mv="urn:schemas-microsoft-com:mac:vml" xmlns:p="http://schemas.openxmlformats.org/presentationml/2006/main" mc:Ignorable="mv" mc:PreserveAttributes="mv:*">
   <p:cSld>
     <p:bg>
       <p:bgRef idx="1001">
@@ -457,7 +459,7 @@
               <a:pPr>
                 <a:defRPr/>
               </a:pPr>
-              <a:t>24/09/2009</a:t>
+              <a:t>9/24/09</a:t>
             </a:fld>
             <a:endParaRPr lang="fr-FR" altLang="ko-KR"/>
           </a:p>
@@ -641,7 +643,7 @@
               <a:pPr>
                 <a:defRPr/>
               </a:pPr>
-              <a:t>‹N°›</a:t>
+              <a:t>‹#›</a:t>
             </a:fld>
             <a:endParaRPr lang="fr-FR" altLang="ko-KR"/>
           </a:p>
@@ -776,7 +778,7 @@
 </file>
 
 <file path=ppt/slideLayouts/slideLayout1.xml><?xml version="1.0" encoding="utf-8"?>
-<p:sldLayout xmlns:a="http://schemas.openxmlformats.org/drawingml/2006/main" xmlns:r="http://schemas.openxmlformats.org/officeDocument/2006/relationships" xmlns:p="http://schemas.openxmlformats.org/presentationml/2006/main" showMasterSp="0" preserve="1" userDrawn="1">
+<p:sldLayout xmlns:a="http://schemas.openxmlformats.org/drawingml/2006/main" xmlns:r="http://schemas.openxmlformats.org/officeDocument/2006/relationships" xmlns:mc="http://schemas.openxmlformats.org/markup-compatibility/2006" xmlns:mv="urn:schemas-microsoft-com:mac:vml" xmlns:p="http://schemas.openxmlformats.org/presentationml/2006/main" mc:Ignorable="mv" mc:PreserveAttributes="mv:*" showMasterSp="0" preserve="1" userDrawn="1">
   <p:cSld name="Titre">
     <p:bg>
       <p:bgPr>
@@ -1032,7 +1034,6 @@
             <a:lvl9pPr marL="3657600" indent="0" algn="ctr" eaLnBrk="1" latinLnBrk="0" hangingPunct="1">
               <a:buNone/>
             </a:lvl9pPr>
-            <a:extLst/>
           </a:lstStyle>
           <a:p>
             <a:pPr algn="r" fontAlgn="auto">
@@ -1146,7 +1147,6 @@
             <a:lvl9pPr marL="3657600" indent="0" algn="ctr" eaLnBrk="1" latinLnBrk="0" hangingPunct="1">
               <a:buNone/>
             </a:lvl9pPr>
-            <a:extLst/>
           </a:lstStyle>
           <a:p>
             <a:r>
@@ -1213,7 +1213,6 @@
                 </a:effectLst>
               </a:defRPr>
             </a:lvl1pPr>
-            <a:extLst/>
           </a:lstStyle>
           <a:p>
             <a:r>
@@ -1288,7 +1287,7 @@
 </file>
 
 <file path=ppt/slideLayouts/slideLayout2.xml><?xml version="1.0" encoding="utf-8"?>
-<p:sldLayout xmlns:a="http://schemas.openxmlformats.org/drawingml/2006/main" xmlns:r="http://schemas.openxmlformats.org/officeDocument/2006/relationships" xmlns:p="http://schemas.openxmlformats.org/presentationml/2006/main" showMasterSp="0" preserve="1" userDrawn="1">
+<p:sldLayout xmlns:a="http://schemas.openxmlformats.org/drawingml/2006/main" xmlns:r="http://schemas.openxmlformats.org/officeDocument/2006/relationships" xmlns:mc="http://schemas.openxmlformats.org/markup-compatibility/2006" xmlns:mv="urn:schemas-microsoft-com:mac:vml" xmlns:p="http://schemas.openxmlformats.org/presentationml/2006/main" mc:Ignorable="mv" mc:PreserveAttributes="mv:*" showMasterSp="0" preserve="1" userDrawn="1">
   <p:cSld name="Sommaire">
     <p:spTree>
       <p:nvGrpSpPr>
@@ -1480,7 +1479,6 @@
                 </a:effectLst>
               </a:defRPr>
             </a:lvl1pPr>
-            <a:extLst/>
           </a:lstStyle>
           <a:p>
             <a:r>
@@ -1596,7 +1594,7 @@
 </file>
 
 <file path=ppt/slideLayouts/slideLayout3.xml><?xml version="1.0" encoding="utf-8"?>
-<p:sldLayout xmlns:a="http://schemas.openxmlformats.org/drawingml/2006/main" xmlns:r="http://schemas.openxmlformats.org/officeDocument/2006/relationships" xmlns:p="http://schemas.openxmlformats.org/presentationml/2006/main" preserve="1" userDrawn="1">
+<p:sldLayout xmlns:a="http://schemas.openxmlformats.org/drawingml/2006/main" xmlns:r="http://schemas.openxmlformats.org/officeDocument/2006/relationships" xmlns:mc="http://schemas.openxmlformats.org/markup-compatibility/2006" xmlns:mv="urn:schemas-microsoft-com:mac:vml" xmlns:p="http://schemas.openxmlformats.org/presentationml/2006/main" mc:Ignorable="mv" mc:PreserveAttributes="mv:*" preserve="1" userDrawn="1">
   <p:cSld name="Diapo classique">
     <p:spTree>
       <p:nvGrpSpPr>
@@ -1751,7 +1749,6 @@
                 </a:effectLst>
               </a:defRPr>
             </a:lvl1pPr>
-            <a:extLst/>
           </a:lstStyle>
           <a:p>
             <a:r>
@@ -1867,7 +1864,7 @@
 </file>
 
 <file path=ppt/slideMasters/slideMaster1.xml><?xml version="1.0" encoding="utf-8"?>
-<p:sldMaster xmlns:a="http://schemas.openxmlformats.org/drawingml/2006/main" xmlns:r="http://schemas.openxmlformats.org/officeDocument/2006/relationships" xmlns:p="http://schemas.openxmlformats.org/presentationml/2006/main" preserve="1">
+<p:sldMaster xmlns:a="http://schemas.openxmlformats.org/drawingml/2006/main" xmlns:r="http://schemas.openxmlformats.org/officeDocument/2006/relationships" xmlns:mc="http://schemas.openxmlformats.org/markup-compatibility/2006" xmlns:mv="urn:schemas-microsoft-com:mac:vml" xmlns:p="http://schemas.openxmlformats.org/presentationml/2006/main" mc:Ignorable="mv" mc:PreserveAttributes="mv:*" preserve="1">
   <p:cSld>
     <p:bg>
       <p:bgRef idx="1003">
@@ -2291,7 +2288,7 @@
                 </a:spcAft>
                 <a:defRPr/>
               </a:pPr>
-              <a:t>‹N°›</a:t>
+              <a:t>‹#›</a:t>
             </a:fld>
             <a:r>
               <a:rPr lang="fr-FR" sz="1100" b="1" kern="0" dirty="0" smtClean="0">
@@ -2546,7 +2543,6 @@
           <a:latin typeface="Calibri" pitchFamily="34" charset="0"/>
         </a:defRPr>
       </a:lvl9pPr>
-      <a:extLst/>
     </p:titleStyle>
     <p:bodyStyle>
       <a:lvl1pPr marL="342900" indent="-342900" algn="l" rtl="0" eaLnBrk="0" fontAlgn="base" hangingPunct="0">
@@ -2690,7 +2686,6 @@
           <a:cs typeface="+mn-cs"/>
         </a:defRPr>
       </a:lvl9pPr>
-      <a:extLst/>
     </p:bodyStyle>
     <p:otherStyle>
       <a:lvl1pPr marL="0" algn="l" rtl="0" eaLnBrk="1" latinLnBrk="0" hangingPunct="1">
@@ -2783,14 +2778,13 @@
           <a:cs typeface="+mn-cs"/>
         </a:defRPr>
       </a:lvl9pPr>
-      <a:extLst/>
     </p:otherStyle>
   </p:txStyles>
 </p:sldMaster>
 </file>
 
 <file path=ppt/slides/slide1.xml><?xml version="1.0" encoding="utf-8"?>
-<p:sld xmlns:a="http://schemas.openxmlformats.org/drawingml/2006/main" xmlns:r="http://schemas.openxmlformats.org/officeDocument/2006/relationships" xmlns:p="http://schemas.openxmlformats.org/presentationml/2006/main">
+<p:sld xmlns:a="http://schemas.openxmlformats.org/drawingml/2006/main" xmlns:r="http://schemas.openxmlformats.org/officeDocument/2006/relationships" xmlns:mc="http://schemas.openxmlformats.org/markup-compatibility/2006" xmlns:mv="urn:schemas-microsoft-com:mac:vml" xmlns:p="http://schemas.openxmlformats.org/presentationml/2006/main" mc:Ignorable="mv" mc:PreserveAttributes="mv:*">
   <p:cSld>
     <p:spTree>
       <p:nvGrpSpPr>
@@ -3127,7 +3121,7 @@
 </file>
 
 <file path=ppt/slides/slide2.xml><?xml version="1.0" encoding="utf-8"?>
-<p:sld xmlns:a="http://schemas.openxmlformats.org/drawingml/2006/main" xmlns:r="http://schemas.openxmlformats.org/officeDocument/2006/relationships" xmlns:p="http://schemas.openxmlformats.org/presentationml/2006/main">
+<p:sld xmlns:a="http://schemas.openxmlformats.org/drawingml/2006/main" xmlns:r="http://schemas.openxmlformats.org/officeDocument/2006/relationships" xmlns:mc="http://schemas.openxmlformats.org/markup-compatibility/2006" xmlns:mv="urn:schemas-microsoft-com:mac:vml" xmlns:p="http://schemas.openxmlformats.org/presentationml/2006/main" mc:Ignorable="mv" mc:PreserveAttributes="mv:*">
   <p:cSld>
     <p:spTree>
       <p:nvGrpSpPr>
@@ -3312,7 +3306,7 @@
 </file>
 
 <file path=ppt/slides/slide3.xml><?xml version="1.0" encoding="utf-8"?>
-<p:sld xmlns:a="http://schemas.openxmlformats.org/drawingml/2006/main" xmlns:r="http://schemas.openxmlformats.org/officeDocument/2006/relationships" xmlns:p="http://schemas.openxmlformats.org/presentationml/2006/main">
+<p:sld xmlns:a="http://schemas.openxmlformats.org/drawingml/2006/main" xmlns:r="http://schemas.openxmlformats.org/officeDocument/2006/relationships" xmlns:mc="http://schemas.openxmlformats.org/markup-compatibility/2006" xmlns:mv="urn:schemas-microsoft-com:mac:vml" xmlns:p="http://schemas.openxmlformats.org/presentationml/2006/main" mc:Ignorable="mv" mc:PreserveAttributes="mv:*">
   <p:cSld>
     <p:spTree>
       <p:nvGrpSpPr>
@@ -3394,33 +3388,73 @@
             <a:pPr lvl="1"/>
             <a:r>
               <a:rPr lang="en-US" dirty="0" smtClean="0"/>
-              <a:t>Act when the spacecraft is going through an error or a fault</a:t>
+              <a:t>Act when the spacecraft is going through an error or a </a:t>
+            </a:r>
+            <a:r>
+              <a:rPr lang="en-US" dirty="0" smtClean="0"/>
+              <a:t>fault</a:t>
             </a:r>
           </a:p>
           <a:p>
             <a:pPr lvl="1"/>
             <a:r>
               <a:rPr lang="en-US" dirty="0" smtClean="0"/>
-              <a:t>Automatic system</a:t>
-            </a:r>
+              <a:t>FDIR is a layered system. If </a:t>
+            </a:r>
+            <a:r>
+              <a:rPr lang="en-US" dirty="0" smtClean="0"/>
+              <a:t>a</a:t>
+            </a:r>
+            <a:r>
+              <a:rPr lang="en-US" dirty="0" smtClean="0"/>
+              <a:t> lower layer cannot resolve </a:t>
+            </a:r>
+            <a:r>
+              <a:rPr lang="en-US" dirty="0" smtClean="0"/>
+              <a:t>an</a:t>
+            </a:r>
+            <a:r>
+              <a:rPr lang="en-US" dirty="0" smtClean="0"/>
+              <a:t> issue it’s forwarded to an upper layer. If the </a:t>
+            </a:r>
+            <a:r>
+              <a:rPr lang="en-US" dirty="0" smtClean="0"/>
+              <a:t>Issue cannot be resolved by the system. It’s escalated to manual control.</a:t>
+            </a:r>
+            <a:endParaRPr lang="en-US" dirty="0" smtClean="0"/>
           </a:p>
           <a:p>
             <a:pPr lvl="1"/>
+            <a:r>
+              <a:rPr lang="en-US" dirty="0" smtClean="0"/>
+              <a:t>Automatic </a:t>
+            </a:r>
+            <a:r>
+              <a:rPr lang="en-US" dirty="0" smtClean="0"/>
+              <a:t>system</a:t>
+            </a:r>
+          </a:p>
+          <a:p>
             <a:endParaRPr lang="en-US" dirty="0" smtClean="0"/>
           </a:p>
           <a:p>
+            <a:r>
+              <a:rPr lang="en-US" dirty="0" smtClean="0"/>
+              <a:t>S</a:t>
+            </a:r>
+            <a:r>
+              <a:rPr lang="en-US" dirty="0" smtClean="0"/>
+              <a:t>paceship crew and flight control can manually control the system</a:t>
+            </a:r>
+          </a:p>
+          <a:p>
+            <a:pPr>
+              <a:buNone/>
+            </a:pPr>
             <a:endParaRPr lang="en-US" dirty="0" smtClean="0"/>
           </a:p>
           <a:p>
-            <a:pPr lvl="1"/>
             <a:endParaRPr lang="en-US" dirty="0" smtClean="0"/>
-          </a:p>
-          <a:p>
-            <a:pPr lvl="1"/>
-            <a:endParaRPr smtClean="0"/>
-          </a:p>
-          <a:p>
-            <a:endParaRPr lang="fr-FR" dirty="0"/>
           </a:p>
         </p:txBody>
       </p:sp>
@@ -3433,7 +3467,7 @@
 </file>
 
 <file path=ppt/slides/slide4.xml><?xml version="1.0" encoding="utf-8"?>
-<p:sld xmlns:a="http://schemas.openxmlformats.org/drawingml/2006/main" xmlns:r="http://schemas.openxmlformats.org/officeDocument/2006/relationships" xmlns:p="http://schemas.openxmlformats.org/presentationml/2006/main">
+<p:sld xmlns:a="http://schemas.openxmlformats.org/drawingml/2006/main" xmlns:r="http://schemas.openxmlformats.org/officeDocument/2006/relationships" xmlns:mc="http://schemas.openxmlformats.org/markup-compatibility/2006" xmlns:mv="urn:schemas-microsoft-com:mac:vml" xmlns:p="http://schemas.openxmlformats.org/presentationml/2006/main" mc:Ignorable="mv" mc:PreserveAttributes="mv:*">
   <p:cSld>
     <p:spTree>
       <p:nvGrpSpPr>
@@ -3500,7 +3534,7 @@
 </file>
 
 <file path=ppt/slides/slide5.xml><?xml version="1.0" encoding="utf-8"?>
-<p:sld xmlns:a="http://schemas.openxmlformats.org/drawingml/2006/main" xmlns:r="http://schemas.openxmlformats.org/officeDocument/2006/relationships" xmlns:p="http://schemas.openxmlformats.org/presentationml/2006/main">
+<p:sld xmlns:a="http://schemas.openxmlformats.org/drawingml/2006/main" xmlns:r="http://schemas.openxmlformats.org/officeDocument/2006/relationships" xmlns:mc="http://schemas.openxmlformats.org/markup-compatibility/2006" xmlns:mv="urn:schemas-microsoft-com:mac:vml" xmlns:p="http://schemas.openxmlformats.org/presentationml/2006/main" mc:Ignorable="mv" mc:PreserveAttributes="mv:*">
   <p:cSld>
     <p:spTree>
       <p:nvGrpSpPr>
@@ -3666,7 +3700,7 @@
 </file>
 
 <file path=ppt/slides/slide6.xml><?xml version="1.0" encoding="utf-8"?>
-<p:sld xmlns:a="http://schemas.openxmlformats.org/drawingml/2006/main" xmlns:r="http://schemas.openxmlformats.org/officeDocument/2006/relationships" xmlns:p="http://schemas.openxmlformats.org/presentationml/2006/main">
+<p:sld xmlns:a="http://schemas.openxmlformats.org/drawingml/2006/main" xmlns:r="http://schemas.openxmlformats.org/officeDocument/2006/relationships" xmlns:mc="http://schemas.openxmlformats.org/markup-compatibility/2006" xmlns:mv="urn:schemas-microsoft-com:mac:vml" xmlns:p="http://schemas.openxmlformats.org/presentationml/2006/main" mc:Ignorable="mv" mc:PreserveAttributes="mv:*">
   <p:cSld>
     <p:spTree>
       <p:nvGrpSpPr>
@@ -3721,7 +3755,7 @@
           <a:lstStyle/>
           <a:p>
             <a:r>
-              <a:rPr sz="2800" smtClean="0"/>
+              <a:rPr sz="2800" dirty="0" smtClean="0"/>
               <a:t>Unmanned spacecraft :</a:t>
             </a:r>
           </a:p>
@@ -3734,7 +3768,7 @@
           </a:p>
           <a:p>
             <a:r>
-              <a:rPr sz="2800" smtClean="0"/>
+              <a:rPr sz="2800" dirty="0" smtClean="0"/>
               <a:t>Manned spacecraft :</a:t>
             </a:r>
           </a:p>
@@ -3747,7 +3781,7 @@
           </a:p>
           <a:p>
             <a:pPr lvl="1"/>
-            <a:endParaRPr smtClean="0"/>
+            <a:endParaRPr dirty="0" smtClean="0"/>
           </a:p>
           <a:p>
             <a:pPr lvl="1"/>
@@ -3764,7 +3798,223 @@
 </file>
 
 <file path=ppt/slides/slide7.xml><?xml version="1.0" encoding="utf-8"?>
-<p:sld xmlns:a="http://schemas.openxmlformats.org/drawingml/2006/main" xmlns:r="http://schemas.openxmlformats.org/officeDocument/2006/relationships" xmlns:p="http://schemas.openxmlformats.org/presentationml/2006/main">
+<p:sld xmlns:a="http://schemas.openxmlformats.org/drawingml/2006/main" xmlns:r="http://schemas.openxmlformats.org/officeDocument/2006/relationships" xmlns:mc="http://schemas.openxmlformats.org/markup-compatibility/2006" xmlns:mv="urn:schemas-microsoft-com:mac:vml" xmlns:p="http://schemas.openxmlformats.org/presentationml/2006/main" mc:Ignorable="mv" mc:PreserveAttributes="mv:*">
+  <p:cSld>
+    <p:spTree>
+      <p:nvGrpSpPr>
+        <p:cNvPr id="1" name=""/>
+        <p:cNvGrpSpPr/>
+        <p:nvPr/>
+      </p:nvGrpSpPr>
+      <p:grpSpPr>
+        <a:xfrm>
+          <a:off x="0" y="0"/>
+          <a:ext cx="0" cy="0"/>
+          <a:chOff x="0" y="0"/>
+          <a:chExt cx="0" cy="0"/>
+        </a:xfrm>
+      </p:grpSpPr>
+      <p:sp>
+        <p:nvSpPr>
+          <p:cNvPr id="2" name="Title 1"/>
+          <p:cNvSpPr>
+            <a:spLocks noGrp="1"/>
+          </p:cNvSpPr>
+          <p:nvPr>
+            <p:ph type="ctrTitle"/>
+          </p:nvPr>
+        </p:nvSpPr>
+        <p:spPr/>
+        <p:txBody>
+          <a:bodyPr/>
+          <a:lstStyle/>
+          <a:p>
+            <a:r>
+              <a:rPr lang="en-US" dirty="0" smtClean="0"/>
+              <a:t>NON-Functional REQUIREMENTS</a:t>
+            </a:r>
+            <a:endParaRPr lang="en-US" dirty="0"/>
+          </a:p>
+        </p:txBody>
+      </p:sp>
+      <p:sp>
+        <p:nvSpPr>
+          <p:cNvPr id="3" name="Text Placeholder 2"/>
+          <p:cNvSpPr>
+            <a:spLocks noGrp="1"/>
+          </p:cNvSpPr>
+          <p:nvPr>
+            <p:ph type="body" sz="quarter" idx="10"/>
+          </p:nvPr>
+        </p:nvSpPr>
+        <p:spPr/>
+        <p:txBody>
+          <a:bodyPr/>
+          <a:lstStyle/>
+          <a:p>
+            <a:r>
+              <a:rPr lang="en-US" sz="2800" dirty="0" smtClean="0"/>
+              <a:t>Testability</a:t>
+            </a:r>
+          </a:p>
+          <a:p>
+            <a:pPr lvl="1"/>
+            <a:r>
+              <a:rPr lang="en-US" sz="2400" dirty="0" smtClean="0"/>
+              <a:t>The system and its parts have to be able to be tested through inspections, simulations and analyses before on-board installation </a:t>
+            </a:r>
+          </a:p>
+          <a:p>
+            <a:r>
+              <a:rPr lang="en-US" sz="2800" dirty="0" smtClean="0"/>
+              <a:t>Reliability</a:t>
+            </a:r>
+          </a:p>
+          <a:p>
+            <a:pPr lvl="1"/>
+            <a:r>
+              <a:rPr lang="en-US" sz="2400" dirty="0" smtClean="0"/>
+              <a:t>The system must be reliable in all operating conditions. System failure could lead to loss of human life.</a:t>
+            </a:r>
+          </a:p>
+          <a:p>
+            <a:r>
+              <a:rPr lang="en-US" sz="2800" dirty="0" smtClean="0"/>
+              <a:t>Availability</a:t>
+            </a:r>
+          </a:p>
+          <a:p>
+            <a:pPr lvl="1"/>
+            <a:r>
+              <a:rPr lang="en-US" sz="2400" dirty="0" smtClean="0"/>
+              <a:t>The system must not lock or stall when processing data. It must work asynchronously.</a:t>
+            </a:r>
+          </a:p>
+        </p:txBody>
+      </p:sp>
+    </p:spTree>
+  </p:cSld>
+  <p:clrMapOvr>
+    <a:masterClrMapping/>
+  </p:clrMapOvr>
+</p:sld>
+</file>
+
+<file path=ppt/slides/slide8.xml><?xml version="1.0" encoding="utf-8"?>
+<p:sld xmlns:a="http://schemas.openxmlformats.org/drawingml/2006/main" xmlns:r="http://schemas.openxmlformats.org/officeDocument/2006/relationships" xmlns:mc="http://schemas.openxmlformats.org/markup-compatibility/2006" xmlns:mv="urn:schemas-microsoft-com:mac:vml" xmlns:p="http://schemas.openxmlformats.org/presentationml/2006/main" mc:Ignorable="mv" mc:PreserveAttributes="mv:*">
+  <p:cSld>
+    <p:spTree>
+      <p:nvGrpSpPr>
+        <p:cNvPr id="1" name=""/>
+        <p:cNvGrpSpPr/>
+        <p:nvPr/>
+      </p:nvGrpSpPr>
+      <p:grpSpPr>
+        <a:xfrm>
+          <a:off x="0" y="0"/>
+          <a:ext cx="0" cy="0"/>
+          <a:chOff x="0" y="0"/>
+          <a:chExt cx="0" cy="0"/>
+        </a:xfrm>
+      </p:grpSpPr>
+      <p:sp>
+        <p:nvSpPr>
+          <p:cNvPr id="2" name="Title 1"/>
+          <p:cNvSpPr>
+            <a:spLocks noGrp="1"/>
+          </p:cNvSpPr>
+          <p:nvPr>
+            <p:ph type="ctrTitle"/>
+          </p:nvPr>
+        </p:nvSpPr>
+        <p:spPr/>
+        <p:txBody>
+          <a:bodyPr/>
+          <a:lstStyle/>
+          <a:p>
+            <a:r>
+              <a:rPr lang="en-US" dirty="0" smtClean="0"/>
+              <a:t>Non-functional requirements</a:t>
+            </a:r>
+            <a:endParaRPr lang="en-US" dirty="0"/>
+          </a:p>
+        </p:txBody>
+      </p:sp>
+      <p:sp>
+        <p:nvSpPr>
+          <p:cNvPr id="3" name="Text Placeholder 2"/>
+          <p:cNvSpPr>
+            <a:spLocks noGrp="1"/>
+          </p:cNvSpPr>
+          <p:nvPr>
+            <p:ph type="body" sz="quarter" idx="10"/>
+          </p:nvPr>
+        </p:nvSpPr>
+        <p:spPr/>
+        <p:txBody>
+          <a:bodyPr/>
+          <a:lstStyle/>
+          <a:p>
+            <a:r>
+              <a:rPr lang="en-US" sz="2800" dirty="0" smtClean="0"/>
+              <a:t>Resilience</a:t>
+            </a:r>
+          </a:p>
+          <a:p>
+            <a:pPr lvl="1"/>
+            <a:r>
+              <a:rPr lang="en-US" sz="2400" dirty="0" smtClean="0"/>
+              <a:t>The system must be able to maintain an acceptable level of service in spite failures in parts of the FDRI system.</a:t>
+            </a:r>
+          </a:p>
+          <a:p>
+            <a:r>
+              <a:rPr lang="en-US" sz="2800" dirty="0" smtClean="0"/>
+              <a:t>Response time</a:t>
+            </a:r>
+          </a:p>
+          <a:p>
+            <a:pPr lvl="1"/>
+            <a:r>
+              <a:rPr lang="en-US" sz="2400" dirty="0" smtClean="0"/>
+              <a:t>The system must respond in timely manner so that problematic systems can be shut down before any damage is done.</a:t>
+            </a:r>
+          </a:p>
+          <a:p>
+            <a:r>
+              <a:rPr lang="en-US" sz="2800" dirty="0" smtClean="0"/>
+              <a:t>Documentation</a:t>
+            </a:r>
+          </a:p>
+          <a:p>
+            <a:pPr lvl="1"/>
+            <a:r>
+              <a:rPr lang="en-US" sz="2400" dirty="0" smtClean="0"/>
+              <a:t>Technical and software documentation has to be accurate so that the spacecraft crew and flight control know how to administer the system and perform actions </a:t>
+            </a:r>
+            <a:r>
+              <a:rPr lang="en-US" sz="2400" smtClean="0"/>
+              <a:t>through it.</a:t>
+            </a:r>
+          </a:p>
+          <a:p>
+            <a:pPr>
+              <a:buNone/>
+            </a:pPr>
+            <a:endParaRPr lang="en-US" dirty="0"/>
+          </a:p>
+        </p:txBody>
+      </p:sp>
+    </p:spTree>
+  </p:cSld>
+  <p:clrMapOvr>
+    <a:masterClrMapping/>
+  </p:clrMapOvr>
+</p:sld>
+</file>
+
+<file path=ppt/slides/slide9.xml><?xml version="1.0" encoding="utf-8"?>
+<p:sld xmlns:a="http://schemas.openxmlformats.org/drawingml/2006/main" xmlns:r="http://schemas.openxmlformats.org/officeDocument/2006/relationships" xmlns:mc="http://schemas.openxmlformats.org/markup-compatibility/2006" xmlns:mv="urn:schemas-microsoft-com:mac:vml" xmlns:p="http://schemas.openxmlformats.org/presentationml/2006/main" mc:Ignorable="mv" mc:PreserveAttributes="mv:*">
   <p:cSld>
     <p:spTree>
       <p:nvGrpSpPr>

</xml_diff>

<commit_message>
added slide for explaining use case diagram
</commit_message>
<xml_diff>
--- a/Project 1/CS554_EuroTeam_Proposal.pptx
+++ b/Project 1/CS554_EuroTeam_Proposal.pptx
@@ -1,14 +1,14 @@
 
 <file path=ppt/presentation.xml><?xml version="1.0" encoding="utf-8"?>
-<p:presentation xmlns:a="http://schemas.openxmlformats.org/drawingml/2006/main" xmlns:r="http://schemas.openxmlformats.org/officeDocument/2006/relationships" xmlns:p="http://schemas.openxmlformats.org/presentationml/2006/main" saveSubsetFonts="1">
+<p:presentation xmlns:a="http://schemas.openxmlformats.org/drawingml/2006/main" xmlns:r="http://schemas.openxmlformats.org/officeDocument/2006/relationships" xmlns:mc="http://schemas.openxmlformats.org/markup-compatibility/2006" xmlns:mv="urn:schemas-microsoft-com:mac:vml" xmlns:p="http://schemas.openxmlformats.org/presentationml/2006/main" mc:Ignorable="mv" mc:PreserveAttributes="mv:*" saveSubsetFonts="1">
   <p:sldMasterIdLst>
     <p:sldMasterId id="2147483660" r:id="rId1"/>
   </p:sldMasterIdLst>
   <p:notesMasterIdLst>
-    <p:notesMasterId r:id="rId19"/>
+    <p:notesMasterId r:id="rId20"/>
   </p:notesMasterIdLst>
   <p:handoutMasterIdLst>
-    <p:handoutMasterId r:id="rId20"/>
+    <p:handoutMasterId r:id="rId21"/>
   </p:handoutMasterIdLst>
   <p:sldIdLst>
     <p:sldId id="256" r:id="rId2"/>
@@ -19,15 +19,16 @@
     <p:sldId id="289" r:id="rId7"/>
     <p:sldId id="291" r:id="rId8"/>
     <p:sldId id="292" r:id="rId9"/>
-    <p:sldId id="293" r:id="rId10"/>
-    <p:sldId id="297" r:id="rId11"/>
-    <p:sldId id="298" r:id="rId12"/>
-    <p:sldId id="299" r:id="rId13"/>
-    <p:sldId id="300" r:id="rId14"/>
-    <p:sldId id="294" r:id="rId15"/>
-    <p:sldId id="295" r:id="rId16"/>
-    <p:sldId id="296" r:id="rId17"/>
-    <p:sldId id="286" r:id="rId18"/>
+    <p:sldId id="301" r:id="rId10"/>
+    <p:sldId id="293" r:id="rId11"/>
+    <p:sldId id="297" r:id="rId12"/>
+    <p:sldId id="298" r:id="rId13"/>
+    <p:sldId id="299" r:id="rId14"/>
+    <p:sldId id="300" r:id="rId15"/>
+    <p:sldId id="294" r:id="rId16"/>
+    <p:sldId id="295" r:id="rId17"/>
+    <p:sldId id="296" r:id="rId18"/>
+    <p:sldId id="286" r:id="rId19"/>
   </p:sldIdLst>
   <p:sldSz cx="9144000" cy="6858000" type="screen4x3"/>
   <p:notesSz cx="6858000" cy="9144000"/>
@@ -160,7 +161,7 @@
 </file>
 
 <file path=ppt/handoutMasters/handoutMaster1.xml><?xml version="1.0" encoding="utf-8"?>
-<p:handoutMaster xmlns:a="http://schemas.openxmlformats.org/drawingml/2006/main" xmlns:r="http://schemas.openxmlformats.org/officeDocument/2006/relationships" xmlns:p="http://schemas.openxmlformats.org/presentationml/2006/main">
+<p:handoutMaster xmlns:a="http://schemas.openxmlformats.org/drawingml/2006/main" xmlns:r="http://schemas.openxmlformats.org/officeDocument/2006/relationships" xmlns:mc="http://schemas.openxmlformats.org/markup-compatibility/2006" xmlns:mv="urn:schemas-microsoft-com:mac:vml" xmlns:p="http://schemas.openxmlformats.org/presentationml/2006/main" mc:Ignorable="mv" mc:PreserveAttributes="mv:*">
   <p:cSld>
     <p:bg>
       <p:bgRef idx="1001">
@@ -263,7 +264,7 @@
               <a:pPr>
                 <a:defRPr/>
               </a:pPr>
-              <a:t>24/09/2009</a:t>
+              <a:t>9/24/09</a:t>
             </a:fld>
             <a:endParaRPr lang="fr-FR" altLang="ko-KR"/>
           </a:p>
@@ -351,7 +352,7 @@
               <a:pPr>
                 <a:defRPr/>
               </a:pPr>
-              <a:t>‹N°›</a:t>
+              <a:t>‹#›</a:t>
             </a:fld>
             <a:endParaRPr lang="fr-FR" altLang="ko-KR"/>
           </a:p>
@@ -364,7 +365,7 @@
 </file>
 
 <file path=ppt/notesMasters/notesMaster1.xml><?xml version="1.0" encoding="utf-8"?>
-<p:notesMaster xmlns:a="http://schemas.openxmlformats.org/drawingml/2006/main" xmlns:r="http://schemas.openxmlformats.org/officeDocument/2006/relationships" xmlns:p="http://schemas.openxmlformats.org/presentationml/2006/main">
+<p:notesMaster xmlns:a="http://schemas.openxmlformats.org/drawingml/2006/main" xmlns:r="http://schemas.openxmlformats.org/officeDocument/2006/relationships" xmlns:mc="http://schemas.openxmlformats.org/markup-compatibility/2006" xmlns:mv="urn:schemas-microsoft-com:mac:vml" xmlns:p="http://schemas.openxmlformats.org/presentationml/2006/main" mc:Ignorable="mv" mc:PreserveAttributes="mv:*">
   <p:cSld>
     <p:bg>
       <p:bgRef idx="1001">
@@ -467,7 +468,7 @@
               <a:pPr>
                 <a:defRPr/>
               </a:pPr>
-              <a:t>24/09/2009</a:t>
+              <a:t>9/24/09</a:t>
             </a:fld>
             <a:endParaRPr lang="fr-FR" altLang="ko-KR"/>
           </a:p>
@@ -651,7 +652,7 @@
               <a:pPr>
                 <a:defRPr/>
               </a:pPr>
-              <a:t>‹N°›</a:t>
+              <a:t>‹#›</a:t>
             </a:fld>
             <a:endParaRPr lang="fr-FR" altLang="ko-KR"/>
           </a:p>
@@ -786,7 +787,7 @@
 </file>
 
 <file path=ppt/slideLayouts/slideLayout1.xml><?xml version="1.0" encoding="utf-8"?>
-<p:sldLayout xmlns:a="http://schemas.openxmlformats.org/drawingml/2006/main" xmlns:r="http://schemas.openxmlformats.org/officeDocument/2006/relationships" xmlns:p="http://schemas.openxmlformats.org/presentationml/2006/main" showMasterSp="0" preserve="1" userDrawn="1">
+<p:sldLayout xmlns:a="http://schemas.openxmlformats.org/drawingml/2006/main" xmlns:r="http://schemas.openxmlformats.org/officeDocument/2006/relationships" xmlns:mc="http://schemas.openxmlformats.org/markup-compatibility/2006" xmlns:mv="urn:schemas-microsoft-com:mac:vml" xmlns:p="http://schemas.openxmlformats.org/presentationml/2006/main" mc:Ignorable="mv" mc:PreserveAttributes="mv:*" showMasterSp="0" preserve="1" userDrawn="1">
   <p:cSld name="Titre">
     <p:bg>
       <p:bgPr>
@@ -1295,7 +1296,7 @@
 </file>
 
 <file path=ppt/slideLayouts/slideLayout2.xml><?xml version="1.0" encoding="utf-8"?>
-<p:sldLayout xmlns:a="http://schemas.openxmlformats.org/drawingml/2006/main" xmlns:r="http://schemas.openxmlformats.org/officeDocument/2006/relationships" xmlns:p="http://schemas.openxmlformats.org/presentationml/2006/main" showMasterSp="0" preserve="1" userDrawn="1">
+<p:sldLayout xmlns:a="http://schemas.openxmlformats.org/drawingml/2006/main" xmlns:r="http://schemas.openxmlformats.org/officeDocument/2006/relationships" xmlns:mc="http://schemas.openxmlformats.org/markup-compatibility/2006" xmlns:mv="urn:schemas-microsoft-com:mac:vml" xmlns:p="http://schemas.openxmlformats.org/presentationml/2006/main" mc:Ignorable="mv" mc:PreserveAttributes="mv:*" showMasterSp="0" preserve="1" userDrawn="1">
   <p:cSld name="Sommaire">
     <p:spTree>
       <p:nvGrpSpPr>
@@ -1602,7 +1603,7 @@
 </file>
 
 <file path=ppt/slideLayouts/slideLayout3.xml><?xml version="1.0" encoding="utf-8"?>
-<p:sldLayout xmlns:a="http://schemas.openxmlformats.org/drawingml/2006/main" xmlns:r="http://schemas.openxmlformats.org/officeDocument/2006/relationships" xmlns:p="http://schemas.openxmlformats.org/presentationml/2006/main" preserve="1" userDrawn="1">
+<p:sldLayout xmlns:a="http://schemas.openxmlformats.org/drawingml/2006/main" xmlns:r="http://schemas.openxmlformats.org/officeDocument/2006/relationships" xmlns:mc="http://schemas.openxmlformats.org/markup-compatibility/2006" xmlns:mv="urn:schemas-microsoft-com:mac:vml" xmlns:p="http://schemas.openxmlformats.org/presentationml/2006/main" mc:Ignorable="mv" mc:PreserveAttributes="mv:*" preserve="1" userDrawn="1">
   <p:cSld name="Diapo classique">
     <p:spTree>
       <p:nvGrpSpPr>
@@ -1872,7 +1873,7 @@
 </file>
 
 <file path=ppt/slideMasters/slideMaster1.xml><?xml version="1.0" encoding="utf-8"?>
-<p:sldMaster xmlns:a="http://schemas.openxmlformats.org/drawingml/2006/main" xmlns:r="http://schemas.openxmlformats.org/officeDocument/2006/relationships" xmlns:p="http://schemas.openxmlformats.org/presentationml/2006/main" preserve="1">
+<p:sldMaster xmlns:a="http://schemas.openxmlformats.org/drawingml/2006/main" xmlns:r="http://schemas.openxmlformats.org/officeDocument/2006/relationships" xmlns:mc="http://schemas.openxmlformats.org/markup-compatibility/2006" xmlns:mv="urn:schemas-microsoft-com:mac:vml" xmlns:p="http://schemas.openxmlformats.org/presentationml/2006/main" mc:Ignorable="mv" mc:PreserveAttributes="mv:*" preserve="1">
   <p:cSld>
     <p:bg>
       <p:bgRef idx="1003">
@@ -2296,7 +2297,7 @@
                 </a:spcAft>
                 <a:defRPr/>
               </a:pPr>
-              <a:t>‹N°›</a:t>
+              <a:t>‹#›</a:t>
             </a:fld>
             <a:r>
               <a:rPr lang="fr-FR" sz="1100" b="1" kern="0" dirty="0" smtClean="0">
@@ -2792,7 +2793,7 @@
 </file>
 
 <file path=ppt/slides/slide1.xml><?xml version="1.0" encoding="utf-8"?>
-<p:sld xmlns:a="http://schemas.openxmlformats.org/drawingml/2006/main" xmlns:r="http://schemas.openxmlformats.org/officeDocument/2006/relationships" xmlns:p="http://schemas.openxmlformats.org/presentationml/2006/main">
+<p:sld xmlns:a="http://schemas.openxmlformats.org/drawingml/2006/main" xmlns:r="http://schemas.openxmlformats.org/officeDocument/2006/relationships" xmlns:mc="http://schemas.openxmlformats.org/markup-compatibility/2006" xmlns:mv="urn:schemas-microsoft-com:mac:vml" xmlns:p="http://schemas.openxmlformats.org/presentationml/2006/main" mc:Ignorable="mv" mc:PreserveAttributes="mv:*">
   <p:cSld>
     <p:spTree>
       <p:nvGrpSpPr>
@@ -3002,25 +3003,7 @@
                   </a:outerShdw>
                 </a:effectLst>
               </a:rPr>
-              <a:t> </a:t>
-            </a:r>
-            <a:r>
-              <a:rPr b="0" cap="none" smtClean="0">
-                <a:ln>
-                  <a:noFill/>
-                </a:ln>
-                <a:solidFill>
-                  <a:schemeClr val="tx1"/>
-                </a:solidFill>
-                <a:effectLst>
-                  <a:outerShdw blurRad="38100" dist="38100" dir="2700000" algn="tl">
-                    <a:srgbClr val="000000">
-                      <a:alpha val="43137"/>
-                    </a:srgbClr>
-                  </a:outerShdw>
-                </a:effectLst>
-              </a:rPr>
-              <a:t>  </a:t>
+              <a:t>   </a:t>
             </a:r>
             <a:r>
               <a:rPr b="0" i="1" cap="none" smtClean="0">
@@ -3040,27 +3023,7 @@
                   </a:outerShdw>
                 </a:effectLst>
               </a:rPr>
-              <a:t>Fault </a:t>
-            </a:r>
-            <a:r>
-              <a:rPr b="0" i="1" cap="none" smtClean="0">
-                <a:ln>
-                  <a:noFill/>
-                </a:ln>
-                <a:solidFill>
-                  <a:schemeClr val="bg1">
-                    <a:lumMod val="65000"/>
-                  </a:schemeClr>
-                </a:solidFill>
-                <a:effectLst>
-                  <a:outerShdw blurRad="38100" dist="38100" dir="2700000" algn="tl">
-                    <a:srgbClr val="000000">
-                      <a:alpha val="43137"/>
-                    </a:srgbClr>
-                  </a:outerShdw>
-                </a:effectLst>
-              </a:rPr>
-              <a:t>protection system</a:t>
+              <a:t>Fault protection system</a:t>
             </a:r>
             <a:endParaRPr sz="2800" b="0" i="1" cap="none" dirty="0">
               <a:ln>
@@ -3210,7 +3173,7 @@
 </file>
 
 <file path=ppt/slides/slide10.xml><?xml version="1.0" encoding="utf-8"?>
-<p:sld xmlns:a="http://schemas.openxmlformats.org/drawingml/2006/main" xmlns:r="http://schemas.openxmlformats.org/officeDocument/2006/relationships" xmlns:p="http://schemas.openxmlformats.org/presentationml/2006/main">
+<p:sld xmlns:a="http://schemas.openxmlformats.org/drawingml/2006/main" xmlns:r="http://schemas.openxmlformats.org/officeDocument/2006/relationships" xmlns:mc="http://schemas.openxmlformats.org/markup-compatibility/2006" xmlns:mv="urn:schemas-microsoft-com:mac:vml" xmlns:p="http://schemas.openxmlformats.org/presentationml/2006/main" mc:Ignorable="mv" mc:PreserveAttributes="mv:*">
   <p:cSld>
     <p:spTree>
       <p:nvGrpSpPr>
@@ -3241,14 +3204,11 @@
           <a:bodyPr/>
           <a:lstStyle/>
           <a:p>
-            <a:pPr>
-              <a:defRPr/>
-            </a:pPr>
-            <a:r>
-              <a:rPr lang="en-US" dirty="0" smtClean="0"/>
-              <a:t>Use CASES Descriptions</a:t>
-            </a:r>
-            <a:endParaRPr lang="en-US" dirty="0"/>
+            <a:r>
+              <a:rPr smtClean="0"/>
+              <a:t>Use case</a:t>
+            </a:r>
+            <a:endParaRPr lang="fr-FR" dirty="0"/>
           </a:p>
         </p:txBody>
       </p:sp>
@@ -3262,91 +3222,15 @@
             <p:ph type="body" sz="quarter" idx="10"/>
           </p:nvPr>
         </p:nvSpPr>
-        <p:spPr>
-          <a:xfrm>
-            <a:off x="285750" y="1214438"/>
-            <a:ext cx="8643938" cy="5357812"/>
-          </a:xfrm>
-        </p:spPr>
+        <p:spPr/>
         <p:txBody>
           <a:bodyPr/>
           <a:lstStyle/>
           <a:p>
             <a:pPr>
-              <a:defRPr/>
-            </a:pPr>
-            <a:r>
-              <a:rPr lang="en-US" sz="3200" dirty="0" smtClean="0"/>
-              <a:t>Shutdown one part of the system:</a:t>
-            </a:r>
-          </a:p>
-          <a:p>
-            <a:pPr lvl="1">
-              <a:defRPr/>
-            </a:pPr>
-            <a:r>
-              <a:rPr lang="en-US" sz="2800" dirty="0" smtClean="0"/>
-              <a:t>Context of use : a part of the system is failed, we want to shutdown it</a:t>
-            </a:r>
-          </a:p>
-          <a:p>
-            <a:pPr lvl="1">
-              <a:defRPr/>
-            </a:pPr>
-            <a:r>
-              <a:rPr sz="2800" smtClean="0"/>
-              <a:t>Actors : Crew / Flight control</a:t>
-            </a:r>
-          </a:p>
-          <a:p>
-            <a:pPr lvl="1">
-              <a:defRPr/>
-            </a:pPr>
-            <a:r>
-              <a:rPr sz="2800" smtClean="0"/>
-              <a:t>Pre-condition: none</a:t>
-            </a:r>
-          </a:p>
-          <a:p>
-            <a:pPr lvl="1">
-              <a:defRPr/>
-            </a:pPr>
-            <a:r>
-              <a:rPr sz="2800" smtClean="0"/>
-              <a:t>Post-condition: the part of the system is shutdown</a:t>
-            </a:r>
-          </a:p>
-          <a:p>
-            <a:pPr lvl="1">
-              <a:defRPr/>
-            </a:pPr>
-            <a:r>
-              <a:rPr sz="2800" smtClean="0"/>
-              <a:t>Guaranty in case of success : any actions could not be done to this part</a:t>
-            </a:r>
-          </a:p>
-          <a:p>
-            <a:pPr lvl="1">
-              <a:defRPr/>
-            </a:pPr>
-            <a:r>
-              <a:rPr sz="2800" smtClean="0"/>
-              <a:t>Guaranty in case of failure : the system turns on</a:t>
-            </a:r>
-          </a:p>
-          <a:p>
-            <a:pPr lvl="1">
-              <a:buFont typeface="Wingdings" pitchFamily="2" charset="2"/>
               <a:buNone/>
-              <a:defRPr/>
-            </a:pPr>
-            <a:endParaRPr smtClean="0"/>
-          </a:p>
-          <a:p>
-            <a:pPr>
-              <a:defRPr/>
-            </a:pPr>
-            <a:endParaRPr lang="en-US" dirty="0"/>
+            </a:pPr>
+            <a:endParaRPr lang="fr-FR" dirty="0"/>
           </a:p>
         </p:txBody>
       </p:sp>
@@ -3359,7 +3243,7 @@
 </file>
 
 <file path=ppt/slides/slide11.xml><?xml version="1.0" encoding="utf-8"?>
-<p:sld xmlns:a="http://schemas.openxmlformats.org/drawingml/2006/main" xmlns:r="http://schemas.openxmlformats.org/officeDocument/2006/relationships" xmlns:p="http://schemas.openxmlformats.org/presentationml/2006/main">
+<p:sld xmlns:a="http://schemas.openxmlformats.org/drawingml/2006/main" xmlns:r="http://schemas.openxmlformats.org/officeDocument/2006/relationships" xmlns:mc="http://schemas.openxmlformats.org/markup-compatibility/2006" xmlns:mv="urn:schemas-microsoft-com:mac:vml" xmlns:p="http://schemas.openxmlformats.org/presentationml/2006/main" mc:Ignorable="mv" mc:PreserveAttributes="mv:*">
   <p:cSld>
     <p:spTree>
       <p:nvGrpSpPr>
@@ -3395,11 +3279,7 @@
             </a:pPr>
             <a:r>
               <a:rPr lang="en-US" dirty="0" smtClean="0"/>
-              <a:t>Use CASES </a:t>
-            </a:r>
-            <a:r>
-              <a:rPr lang="en-US" dirty="0" smtClean="0"/>
-              <a:t>Descriptions (cont.)</a:t>
+              <a:t>Use CASES Descriptions</a:t>
             </a:r>
             <a:endParaRPr lang="en-US" dirty="0"/>
           </a:p>
@@ -3430,7 +3310,7 @@
             </a:pPr>
             <a:r>
               <a:rPr lang="en-US" sz="3200" dirty="0" smtClean="0"/>
-              <a:t>Restart one part of the system:</a:t>
+              <a:t>Shutdown one part of the system:</a:t>
             </a:r>
           </a:p>
           <a:p>
@@ -3439,7 +3319,7 @@
             </a:pPr>
             <a:r>
               <a:rPr lang="en-US" sz="2800" dirty="0" smtClean="0"/>
-              <a:t>Context of use : a part of the system is shutdown, we want to restart it</a:t>
+              <a:t>Context of use : a part of the system is failed, we want to shutdown it</a:t>
             </a:r>
           </a:p>
           <a:p>
@@ -3457,7 +3337,7 @@
             </a:pPr>
             <a:r>
               <a:rPr sz="2800" smtClean="0"/>
-              <a:t>Pre-condition: the part is shutdown</a:t>
+              <a:t>Pre-condition: none</a:t>
             </a:r>
           </a:p>
           <a:p>
@@ -3466,7 +3346,7 @@
             </a:pPr>
             <a:r>
               <a:rPr sz="2800" smtClean="0"/>
-              <a:t>Post-condition: the part is switched on</a:t>
+              <a:t>Post-condition: the part of the system is shutdown</a:t>
             </a:r>
           </a:p>
           <a:p>
@@ -3475,7 +3355,7 @@
             </a:pPr>
             <a:r>
               <a:rPr sz="2800" smtClean="0"/>
-              <a:t>Guaranty in case of success : Any action could be done after reboot</a:t>
+              <a:t>Guaranty in case of success : any actions could not be done to this part</a:t>
             </a:r>
           </a:p>
           <a:p>
@@ -3484,7 +3364,7 @@
             </a:pPr>
             <a:r>
               <a:rPr sz="2800" smtClean="0"/>
-              <a:t>Guaranty in case of failure : the system is off yet</a:t>
+              <a:t>Guaranty in case of failure : the system turns on</a:t>
             </a:r>
           </a:p>
           <a:p>
@@ -3512,7 +3392,7 @@
 </file>
 
 <file path=ppt/slides/slide12.xml><?xml version="1.0" encoding="utf-8"?>
-<p:sld xmlns:a="http://schemas.openxmlformats.org/drawingml/2006/main" xmlns:r="http://schemas.openxmlformats.org/officeDocument/2006/relationships" xmlns:p="http://schemas.openxmlformats.org/presentationml/2006/main">
+<p:sld xmlns:a="http://schemas.openxmlformats.org/drawingml/2006/main" xmlns:r="http://schemas.openxmlformats.org/officeDocument/2006/relationships" xmlns:mc="http://schemas.openxmlformats.org/markup-compatibility/2006" xmlns:mv="urn:schemas-microsoft-com:mac:vml" xmlns:p="http://schemas.openxmlformats.org/presentationml/2006/main" mc:Ignorable="mv" mc:PreserveAttributes="mv:*">
   <p:cSld>
     <p:spTree>
       <p:nvGrpSpPr>
@@ -3548,11 +3428,7 @@
             </a:pPr>
             <a:r>
               <a:rPr lang="en-US" dirty="0" smtClean="0"/>
-              <a:t>Use CASES </a:t>
-            </a:r>
-            <a:r>
-              <a:rPr lang="en-US" dirty="0" smtClean="0"/>
-              <a:t>Descriptions (cont.)</a:t>
+              <a:t>Use CASES Descriptions (cont.)</a:t>
             </a:r>
             <a:endParaRPr lang="en-US" dirty="0"/>
           </a:p>
@@ -3583,7 +3459,7 @@
             </a:pPr>
             <a:r>
               <a:rPr lang="en-US" sz="3200" dirty="0" smtClean="0"/>
-              <a:t>Switch to backup system:</a:t>
+              <a:t>Restart one part of the system:</a:t>
             </a:r>
           </a:p>
           <a:p>
@@ -3592,7 +3468,7 @@
             </a:pPr>
             <a:r>
               <a:rPr lang="en-US" sz="2800" dirty="0" smtClean="0"/>
-              <a:t>Context of use : the current system is corrupted</a:t>
+              <a:t>Context of use : a part of the system is shutdown, we want to restart it</a:t>
             </a:r>
           </a:p>
           <a:p>
@@ -3610,7 +3486,7 @@
             </a:pPr>
             <a:r>
               <a:rPr sz="2800" smtClean="0"/>
-              <a:t>Pre-condition: none</a:t>
+              <a:t>Pre-condition: the part is shutdown</a:t>
             </a:r>
           </a:p>
           <a:p>
@@ -3619,7 +3495,7 @@
             </a:pPr>
             <a:r>
               <a:rPr sz="2800" smtClean="0"/>
-              <a:t>Post-condition: the faulty system is switched to a spare system</a:t>
+              <a:t>Post-condition: the part is switched on</a:t>
             </a:r>
           </a:p>
           <a:p>
@@ -3628,7 +3504,7 @@
             </a:pPr>
             <a:r>
               <a:rPr sz="2800" smtClean="0"/>
-              <a:t>Guaranty in case of success : the system is not corrupted yet</a:t>
+              <a:t>Guaranty in case of success : Any action could be done after reboot</a:t>
             </a:r>
           </a:p>
           <a:p>
@@ -3637,7 +3513,7 @@
             </a:pPr>
             <a:r>
               <a:rPr sz="2800" smtClean="0"/>
-              <a:t>Guaranty in case of failure : none</a:t>
+              <a:t>Guaranty in case of failure : the system is off yet</a:t>
             </a:r>
           </a:p>
           <a:p>
@@ -3665,7 +3541,7 @@
 </file>
 
 <file path=ppt/slides/slide13.xml><?xml version="1.0" encoding="utf-8"?>
-<p:sld xmlns:a="http://schemas.openxmlformats.org/drawingml/2006/main" xmlns:r="http://schemas.openxmlformats.org/officeDocument/2006/relationships" xmlns:p="http://schemas.openxmlformats.org/presentationml/2006/main">
+<p:sld xmlns:a="http://schemas.openxmlformats.org/drawingml/2006/main" xmlns:r="http://schemas.openxmlformats.org/officeDocument/2006/relationships" xmlns:mc="http://schemas.openxmlformats.org/markup-compatibility/2006" xmlns:mv="urn:schemas-microsoft-com:mac:vml" xmlns:p="http://schemas.openxmlformats.org/presentationml/2006/main" mc:Ignorable="mv" mc:PreserveAttributes="mv:*">
   <p:cSld>
     <p:spTree>
       <p:nvGrpSpPr>
@@ -3701,11 +3577,7 @@
             </a:pPr>
             <a:r>
               <a:rPr lang="en-US" dirty="0" smtClean="0"/>
-              <a:t>Use CASES </a:t>
-            </a:r>
-            <a:r>
-              <a:rPr lang="en-US" dirty="0" smtClean="0"/>
-              <a:t>Descriptions (cont.)</a:t>
+              <a:t>Use CASES Descriptions (cont.)</a:t>
             </a:r>
             <a:endParaRPr lang="en-US" dirty="0"/>
           </a:p>
@@ -3736,7 +3608,7 @@
             </a:pPr>
             <a:r>
               <a:rPr lang="en-US" sz="3200" dirty="0" smtClean="0"/>
-              <a:t>Find information about a part of the system:</a:t>
+              <a:t>Switch to backup system:</a:t>
             </a:r>
           </a:p>
           <a:p>
@@ -3745,7 +3617,7 @@
             </a:pPr>
             <a:r>
               <a:rPr lang="en-US" sz="2800" dirty="0" smtClean="0"/>
-              <a:t>Context of use : the crew wants to know some information about a part of the system</a:t>
+              <a:t>Context of use : the current system is corrupted</a:t>
             </a:r>
           </a:p>
           <a:p>
@@ -3772,7 +3644,7 @@
             </a:pPr>
             <a:r>
               <a:rPr sz="2800" smtClean="0"/>
-              <a:t>Post-condition: the crew receives the information</a:t>
+              <a:t>Post-condition: the faulty system is switched to a spare system</a:t>
             </a:r>
           </a:p>
           <a:p>
@@ -3781,7 +3653,7 @@
             </a:pPr>
             <a:r>
               <a:rPr sz="2800" smtClean="0"/>
-              <a:t>Guaranty in case of success : we have the information</a:t>
+              <a:t>Guaranty in case of success : the system is not corrupted yet</a:t>
             </a:r>
           </a:p>
           <a:p>
@@ -3790,7 +3662,7 @@
             </a:pPr>
             <a:r>
               <a:rPr sz="2800" smtClean="0"/>
-              <a:t>Guaranty in case of failure :  we don't have the information</a:t>
+              <a:t>Guaranty in case of failure : none</a:t>
             </a:r>
           </a:p>
           <a:p>
@@ -3818,7 +3690,7 @@
 </file>
 
 <file path=ppt/slides/slide14.xml><?xml version="1.0" encoding="utf-8"?>
-<p:sld xmlns:a="http://schemas.openxmlformats.org/drawingml/2006/main" xmlns:r="http://schemas.openxmlformats.org/officeDocument/2006/relationships" xmlns:p="http://schemas.openxmlformats.org/presentationml/2006/main">
+<p:sld xmlns:a="http://schemas.openxmlformats.org/drawingml/2006/main" xmlns:r="http://schemas.openxmlformats.org/officeDocument/2006/relationships" xmlns:mc="http://schemas.openxmlformats.org/markup-compatibility/2006" xmlns:mv="urn:schemas-microsoft-com:mac:vml" xmlns:p="http://schemas.openxmlformats.org/presentationml/2006/main" mc:Ignorable="mv" mc:PreserveAttributes="mv:*">
   <p:cSld>
     <p:spTree>
       <p:nvGrpSpPr>
@@ -3849,11 +3721,14 @@
           <a:bodyPr/>
           <a:lstStyle/>
           <a:p>
-            <a:r>
-              <a:rPr smtClean="0"/>
-              <a:t>Sequence diagram</a:t>
-            </a:r>
-            <a:endParaRPr lang="fr-FR" dirty="0"/>
+            <a:pPr>
+              <a:defRPr/>
+            </a:pPr>
+            <a:r>
+              <a:rPr lang="en-US" dirty="0" smtClean="0"/>
+              <a:t>Use CASES Descriptions (cont.)</a:t>
+            </a:r>
+            <a:endParaRPr lang="en-US" dirty="0"/>
           </a:p>
         </p:txBody>
       </p:sp>
@@ -3867,16 +3742,91 @@
             <p:ph type="body" sz="quarter" idx="10"/>
           </p:nvPr>
         </p:nvSpPr>
-        <p:spPr/>
+        <p:spPr>
+          <a:xfrm>
+            <a:off x="285750" y="1214438"/>
+            <a:ext cx="8643938" cy="5357812"/>
+          </a:xfrm>
+        </p:spPr>
         <p:txBody>
           <a:bodyPr/>
           <a:lstStyle/>
           <a:p>
-            <a:r>
-              <a:rPr smtClean="0"/>
-              <a:t>Fault recovering</a:t>
-            </a:r>
-            <a:endParaRPr lang="fr-FR" dirty="0"/>
+            <a:pPr>
+              <a:defRPr/>
+            </a:pPr>
+            <a:r>
+              <a:rPr lang="en-US" sz="3200" dirty="0" smtClean="0"/>
+              <a:t>Find information about a part of the system:</a:t>
+            </a:r>
+          </a:p>
+          <a:p>
+            <a:pPr lvl="1">
+              <a:defRPr/>
+            </a:pPr>
+            <a:r>
+              <a:rPr lang="en-US" sz="2800" dirty="0" smtClean="0"/>
+              <a:t>Context of use : the crew wants to know some information about a part of the system</a:t>
+            </a:r>
+          </a:p>
+          <a:p>
+            <a:pPr lvl="1">
+              <a:defRPr/>
+            </a:pPr>
+            <a:r>
+              <a:rPr sz="2800" smtClean="0"/>
+              <a:t>Actors : Crew / Flight control</a:t>
+            </a:r>
+          </a:p>
+          <a:p>
+            <a:pPr lvl="1">
+              <a:defRPr/>
+            </a:pPr>
+            <a:r>
+              <a:rPr sz="2800" smtClean="0"/>
+              <a:t>Pre-condition: none</a:t>
+            </a:r>
+          </a:p>
+          <a:p>
+            <a:pPr lvl="1">
+              <a:defRPr/>
+            </a:pPr>
+            <a:r>
+              <a:rPr sz="2800" smtClean="0"/>
+              <a:t>Post-condition: the crew receives the information</a:t>
+            </a:r>
+          </a:p>
+          <a:p>
+            <a:pPr lvl="1">
+              <a:defRPr/>
+            </a:pPr>
+            <a:r>
+              <a:rPr sz="2800" smtClean="0"/>
+              <a:t>Guaranty in case of success : we have the information</a:t>
+            </a:r>
+          </a:p>
+          <a:p>
+            <a:pPr lvl="1">
+              <a:defRPr/>
+            </a:pPr>
+            <a:r>
+              <a:rPr sz="2800" smtClean="0"/>
+              <a:t>Guaranty in case of failure :  we don't have the information</a:t>
+            </a:r>
+          </a:p>
+          <a:p>
+            <a:pPr lvl="1">
+              <a:buFont typeface="Wingdings" pitchFamily="2" charset="2"/>
+              <a:buNone/>
+              <a:defRPr/>
+            </a:pPr>
+            <a:endParaRPr smtClean="0"/>
+          </a:p>
+          <a:p>
+            <a:pPr>
+              <a:defRPr/>
+            </a:pPr>
+            <a:endParaRPr lang="en-US" dirty="0"/>
           </a:p>
         </p:txBody>
       </p:sp>
@@ -3889,7 +3839,7 @@
 </file>
 
 <file path=ppt/slides/slide15.xml><?xml version="1.0" encoding="utf-8"?>
-<p:sld xmlns:a="http://schemas.openxmlformats.org/drawingml/2006/main" xmlns:r="http://schemas.openxmlformats.org/officeDocument/2006/relationships" xmlns:p="http://schemas.openxmlformats.org/presentationml/2006/main">
+<p:sld xmlns:a="http://schemas.openxmlformats.org/drawingml/2006/main" xmlns:r="http://schemas.openxmlformats.org/officeDocument/2006/relationships" xmlns:mc="http://schemas.openxmlformats.org/markup-compatibility/2006" xmlns:mv="urn:schemas-microsoft-com:mac:vml" xmlns:p="http://schemas.openxmlformats.org/presentationml/2006/main" mc:Ignorable="mv" mc:PreserveAttributes="mv:*">
   <p:cSld>
     <p:spTree>
       <p:nvGrpSpPr>
@@ -3922,7 +3872,7 @@
           <a:p>
             <a:r>
               <a:rPr smtClean="0"/>
-              <a:t>Sequence diagram (cont.)</a:t>
+              <a:t>Sequence diagram</a:t>
             </a:r>
             <a:endParaRPr lang="fr-FR" dirty="0"/>
           </a:p>
@@ -3945,7 +3895,7 @@
           <a:p>
             <a:r>
               <a:rPr smtClean="0"/>
-              <a:t>Safing response</a:t>
+              <a:t>Fault recovering</a:t>
             </a:r>
             <a:endParaRPr lang="fr-FR" dirty="0"/>
           </a:p>
@@ -3960,7 +3910,7 @@
 </file>
 
 <file path=ppt/slides/slide16.xml><?xml version="1.0" encoding="utf-8"?>
-<p:sld xmlns:a="http://schemas.openxmlformats.org/drawingml/2006/main" xmlns:r="http://schemas.openxmlformats.org/officeDocument/2006/relationships" xmlns:p="http://schemas.openxmlformats.org/presentationml/2006/main">
+<p:sld xmlns:a="http://schemas.openxmlformats.org/drawingml/2006/main" xmlns:r="http://schemas.openxmlformats.org/officeDocument/2006/relationships" xmlns:mc="http://schemas.openxmlformats.org/markup-compatibility/2006" xmlns:mv="urn:schemas-microsoft-com:mac:vml" xmlns:p="http://schemas.openxmlformats.org/presentationml/2006/main" mc:Ignorable="mv" mc:PreserveAttributes="mv:*">
   <p:cSld>
     <p:spTree>
       <p:nvGrpSpPr>
@@ -4016,7 +3966,7 @@
           <a:p>
             <a:r>
               <a:rPr smtClean="0"/>
-              <a:t>Critical failure</a:t>
+              <a:t>Safing response</a:t>
             </a:r>
             <a:endParaRPr lang="fr-FR" dirty="0"/>
           </a:p>
@@ -4031,7 +3981,78 @@
 </file>
 
 <file path=ppt/slides/slide17.xml><?xml version="1.0" encoding="utf-8"?>
-<p:sld xmlns:a="http://schemas.openxmlformats.org/drawingml/2006/main" xmlns:r="http://schemas.openxmlformats.org/officeDocument/2006/relationships" xmlns:p="http://schemas.openxmlformats.org/presentationml/2006/main">
+<p:sld xmlns:a="http://schemas.openxmlformats.org/drawingml/2006/main" xmlns:r="http://schemas.openxmlformats.org/officeDocument/2006/relationships" xmlns:mc="http://schemas.openxmlformats.org/markup-compatibility/2006" xmlns:mv="urn:schemas-microsoft-com:mac:vml" xmlns:p="http://schemas.openxmlformats.org/presentationml/2006/main" mc:Ignorable="mv" mc:PreserveAttributes="mv:*">
+  <p:cSld>
+    <p:spTree>
+      <p:nvGrpSpPr>
+        <p:cNvPr id="1" name=""/>
+        <p:cNvGrpSpPr/>
+        <p:nvPr/>
+      </p:nvGrpSpPr>
+      <p:grpSpPr>
+        <a:xfrm>
+          <a:off x="0" y="0"/>
+          <a:ext cx="0" cy="0"/>
+          <a:chOff x="0" y="0"/>
+          <a:chExt cx="0" cy="0"/>
+        </a:xfrm>
+      </p:grpSpPr>
+      <p:sp>
+        <p:nvSpPr>
+          <p:cNvPr id="2" name="Titre 1"/>
+          <p:cNvSpPr>
+            <a:spLocks noGrp="1"/>
+          </p:cNvSpPr>
+          <p:nvPr>
+            <p:ph type="ctrTitle"/>
+          </p:nvPr>
+        </p:nvSpPr>
+        <p:spPr/>
+        <p:txBody>
+          <a:bodyPr/>
+          <a:lstStyle/>
+          <a:p>
+            <a:r>
+              <a:rPr smtClean="0"/>
+              <a:t>Sequence diagram (cont.)</a:t>
+            </a:r>
+            <a:endParaRPr lang="fr-FR" dirty="0"/>
+          </a:p>
+        </p:txBody>
+      </p:sp>
+      <p:sp>
+        <p:nvSpPr>
+          <p:cNvPr id="3" name="Espace réservé du texte 2"/>
+          <p:cNvSpPr>
+            <a:spLocks noGrp="1"/>
+          </p:cNvSpPr>
+          <p:nvPr>
+            <p:ph type="body" sz="quarter" idx="10"/>
+          </p:nvPr>
+        </p:nvSpPr>
+        <p:spPr/>
+        <p:txBody>
+          <a:bodyPr/>
+          <a:lstStyle/>
+          <a:p>
+            <a:r>
+              <a:rPr smtClean="0"/>
+              <a:t>Critical failure</a:t>
+            </a:r>
+            <a:endParaRPr lang="fr-FR" dirty="0"/>
+          </a:p>
+        </p:txBody>
+      </p:sp>
+    </p:spTree>
+  </p:cSld>
+  <p:clrMapOvr>
+    <a:masterClrMapping/>
+  </p:clrMapOvr>
+</p:sld>
+</file>
+
+<file path=ppt/slides/slide18.xml><?xml version="1.0" encoding="utf-8"?>
+<p:sld xmlns:a="http://schemas.openxmlformats.org/drawingml/2006/main" xmlns:r="http://schemas.openxmlformats.org/officeDocument/2006/relationships" xmlns:mc="http://schemas.openxmlformats.org/markup-compatibility/2006" xmlns:mv="urn:schemas-microsoft-com:mac:vml" xmlns:p="http://schemas.openxmlformats.org/presentationml/2006/main" mc:Ignorable="mv" mc:PreserveAttributes="mv:*">
   <p:cSld>
     <p:spTree>
       <p:nvGrpSpPr>
@@ -4134,7 +4155,7 @@
 </file>
 
 <file path=ppt/slides/slide2.xml><?xml version="1.0" encoding="utf-8"?>
-<p:sld xmlns:a="http://schemas.openxmlformats.org/drawingml/2006/main" xmlns:r="http://schemas.openxmlformats.org/officeDocument/2006/relationships" xmlns:p="http://schemas.openxmlformats.org/presentationml/2006/main">
+<p:sld xmlns:a="http://schemas.openxmlformats.org/drawingml/2006/main" xmlns:r="http://schemas.openxmlformats.org/officeDocument/2006/relationships" xmlns:mc="http://schemas.openxmlformats.org/markup-compatibility/2006" xmlns:mv="urn:schemas-microsoft-com:mac:vml" xmlns:p="http://schemas.openxmlformats.org/presentationml/2006/main" mc:Ignorable="mv" mc:PreserveAttributes="mv:*">
   <p:cSld>
     <p:spTree>
       <p:nvGrpSpPr>
@@ -4276,9 +4297,6 @@
               </a:rPr>
               <a:t>Use-case </a:t>
             </a:r>
-            <a:endParaRPr altLang="ko-KR" smtClean="0">
-              <a:ea typeface="굴림" charset="-127"/>
-            </a:endParaRPr>
           </a:p>
           <a:p>
             <a:pPr lvl="2" eaLnBrk="1" hangingPunct="1">
@@ -4364,7 +4382,7 @@
 </file>
 
 <file path=ppt/slides/slide3.xml><?xml version="1.0" encoding="utf-8"?>
-<p:sld xmlns:a="http://schemas.openxmlformats.org/drawingml/2006/main" xmlns:r="http://schemas.openxmlformats.org/officeDocument/2006/relationships" xmlns:p="http://schemas.openxmlformats.org/presentationml/2006/main">
+<p:sld xmlns:a="http://schemas.openxmlformats.org/drawingml/2006/main" xmlns:r="http://schemas.openxmlformats.org/officeDocument/2006/relationships" xmlns:mc="http://schemas.openxmlformats.org/markup-compatibility/2006" xmlns:mv="urn:schemas-microsoft-com:mac:vml" xmlns:p="http://schemas.openxmlformats.org/presentationml/2006/main" mc:Ignorable="mv" mc:PreserveAttributes="mv:*">
   <p:cSld>
     <p:spTree>
       <p:nvGrpSpPr>
@@ -4492,7 +4510,7 @@
 </file>
 
 <file path=ppt/slides/slide4.xml><?xml version="1.0" encoding="utf-8"?>
-<p:sld xmlns:a="http://schemas.openxmlformats.org/drawingml/2006/main" xmlns:r="http://schemas.openxmlformats.org/officeDocument/2006/relationships" xmlns:p="http://schemas.openxmlformats.org/presentationml/2006/main">
+<p:sld xmlns:a="http://schemas.openxmlformats.org/drawingml/2006/main" xmlns:r="http://schemas.openxmlformats.org/officeDocument/2006/relationships" xmlns:mc="http://schemas.openxmlformats.org/markup-compatibility/2006" xmlns:mv="urn:schemas-microsoft-com:mac:vml" xmlns:p="http://schemas.openxmlformats.org/presentationml/2006/main" mc:Ignorable="mv" mc:PreserveAttributes="mv:*">
   <p:cSld>
     <p:spTree>
       <p:nvGrpSpPr>
@@ -4559,7 +4577,7 @@
 </file>
 
 <file path=ppt/slides/slide5.xml><?xml version="1.0" encoding="utf-8"?>
-<p:sld xmlns:a="http://schemas.openxmlformats.org/drawingml/2006/main" xmlns:r="http://schemas.openxmlformats.org/officeDocument/2006/relationships" xmlns:p="http://schemas.openxmlformats.org/presentationml/2006/main">
+<p:sld xmlns:a="http://schemas.openxmlformats.org/drawingml/2006/main" xmlns:r="http://schemas.openxmlformats.org/officeDocument/2006/relationships" xmlns:mc="http://schemas.openxmlformats.org/markup-compatibility/2006" xmlns:mv="urn:schemas-microsoft-com:mac:vml" xmlns:p="http://schemas.openxmlformats.org/presentationml/2006/main" mc:Ignorable="mv" mc:PreserveAttributes="mv:*">
   <p:cSld>
     <p:spTree>
       <p:nvGrpSpPr>
@@ -4715,7 +4733,7 @@
 </file>
 
 <file path=ppt/slides/slide6.xml><?xml version="1.0" encoding="utf-8"?>
-<p:sld xmlns:a="http://schemas.openxmlformats.org/drawingml/2006/main" xmlns:r="http://schemas.openxmlformats.org/officeDocument/2006/relationships" xmlns:p="http://schemas.openxmlformats.org/presentationml/2006/main">
+<p:sld xmlns:a="http://schemas.openxmlformats.org/drawingml/2006/main" xmlns:r="http://schemas.openxmlformats.org/officeDocument/2006/relationships" xmlns:mc="http://schemas.openxmlformats.org/markup-compatibility/2006" xmlns:mv="urn:schemas-microsoft-com:mac:vml" xmlns:p="http://schemas.openxmlformats.org/presentationml/2006/main" mc:Ignorable="mv" mc:PreserveAttributes="mv:*">
   <p:cSld>
     <p:spTree>
       <p:nvGrpSpPr>
@@ -4813,7 +4831,7 @@
 </file>
 
 <file path=ppt/slides/slide7.xml><?xml version="1.0" encoding="utf-8"?>
-<p:sld xmlns:a="http://schemas.openxmlformats.org/drawingml/2006/main" xmlns:r="http://schemas.openxmlformats.org/officeDocument/2006/relationships" xmlns:p="http://schemas.openxmlformats.org/presentationml/2006/main">
+<p:sld xmlns:a="http://schemas.openxmlformats.org/drawingml/2006/main" xmlns:r="http://schemas.openxmlformats.org/officeDocument/2006/relationships" xmlns:mc="http://schemas.openxmlformats.org/markup-compatibility/2006" xmlns:mv="urn:schemas-microsoft-com:mac:vml" xmlns:p="http://schemas.openxmlformats.org/presentationml/2006/main" mc:Ignorable="mv" mc:PreserveAttributes="mv:*">
   <p:cSld>
     <p:spTree>
       <p:nvGrpSpPr>
@@ -4916,7 +4934,7 @@
 </file>
 
 <file path=ppt/slides/slide8.xml><?xml version="1.0" encoding="utf-8"?>
-<p:sld xmlns:a="http://schemas.openxmlformats.org/drawingml/2006/main" xmlns:r="http://schemas.openxmlformats.org/officeDocument/2006/relationships" xmlns:p="http://schemas.openxmlformats.org/presentationml/2006/main">
+<p:sld xmlns:a="http://schemas.openxmlformats.org/drawingml/2006/main" xmlns:r="http://schemas.openxmlformats.org/officeDocument/2006/relationships" xmlns:mc="http://schemas.openxmlformats.org/markup-compatibility/2006" xmlns:mv="urn:schemas-microsoft-com:mac:vml" xmlns:p="http://schemas.openxmlformats.org/presentationml/2006/main" mc:Ignorable="mv" mc:PreserveAttributes="mv:*">
   <p:cSld>
     <p:spTree>
       <p:nvGrpSpPr>
@@ -5029,7 +5047,7 @@
 </file>
 
 <file path=ppt/slides/slide9.xml><?xml version="1.0" encoding="utf-8"?>
-<p:sld xmlns:a="http://schemas.openxmlformats.org/drawingml/2006/main" xmlns:r="http://schemas.openxmlformats.org/officeDocument/2006/relationships" xmlns:p="http://schemas.openxmlformats.org/presentationml/2006/main">
+<p:sld xmlns:a="http://schemas.openxmlformats.org/drawingml/2006/main" xmlns:r="http://schemas.openxmlformats.org/officeDocument/2006/relationships" xmlns:mc="http://schemas.openxmlformats.org/markup-compatibility/2006" xmlns:mv="urn:schemas-microsoft-com:mac:vml" xmlns:p="http://schemas.openxmlformats.org/presentationml/2006/main" mc:Ignorable="mv" mc:PreserveAttributes="mv:*">
   <p:cSld>
     <p:spTree>
       <p:nvGrpSpPr>
@@ -5047,7 +5065,7 @@
       </p:grpSpPr>
       <p:sp>
         <p:nvSpPr>
-          <p:cNvPr id="2" name="Titre 1"/>
+          <p:cNvPr id="2" name="Title 1"/>
           <p:cNvSpPr>
             <a:spLocks noGrp="1"/>
           </p:cNvSpPr>
@@ -5061,16 +5079,16 @@
           <a:lstStyle/>
           <a:p>
             <a:r>
-              <a:rPr smtClean="0"/>
-              <a:t>Use case</a:t>
-            </a:r>
-            <a:endParaRPr lang="fr-FR" dirty="0"/>
-          </a:p>
-        </p:txBody>
-      </p:sp>
-      <p:sp>
-        <p:nvSpPr>
-          <p:cNvPr id="3" name="Espace réservé du texte 2"/>
+              <a:rPr lang="en-US" dirty="0" smtClean="0"/>
+              <a:t>Use case diagram explained</a:t>
+            </a:r>
+            <a:endParaRPr lang="en-US" dirty="0"/>
+          </a:p>
+        </p:txBody>
+      </p:sp>
+      <p:sp>
+        <p:nvSpPr>
+          <p:cNvPr id="3" name="Text Placeholder 2"/>
           <p:cNvSpPr>
             <a:spLocks noGrp="1"/>
           </p:cNvSpPr>
@@ -5083,7 +5101,23 @@
           <a:bodyPr/>
           <a:lstStyle/>
           <a:p>
-            <a:endParaRPr lang="fr-FR"/>
+            <a:r>
+              <a:rPr lang="en-US" sz="2800" dirty="0" smtClean="0"/>
+              <a:t>Most of the time FDRI works automatically. However, spaceship crew and flight control can manually control the </a:t>
+            </a:r>
+            <a:r>
+              <a:rPr lang="en-US" sz="2800" dirty="0" smtClean="0"/>
+              <a:t>system.</a:t>
+            </a:r>
+          </a:p>
+          <a:p>
+            <a:r>
+              <a:rPr lang="en-US" sz="2800" dirty="0" smtClean="0"/>
+              <a:t>These interactions are represented in the following use case diagram.</a:t>
+            </a:r>
+          </a:p>
+          <a:p>
+            <a:endParaRPr lang="en-US" dirty="0"/>
           </a:p>
         </p:txBody>
       </p:sp>

</xml_diff>